<commit_message>
cut content to reduce time
</commit_message>
<xml_diff>
--- a/GfCE_2015.pptx
+++ b/GfCE_2015.pptx
@@ -5,26 +5,24 @@
     <p:sldMasterId id="2147483648" r:id="rId1"/>
   </p:sldMasterIdLst>
   <p:notesMasterIdLst>
-    <p:notesMasterId r:id="rId19"/>
+    <p:notesMasterId r:id="rId17"/>
   </p:notesMasterIdLst>
   <p:sldIdLst>
     <p:sldId id="256" r:id="rId2"/>
     <p:sldId id="277" r:id="rId3"/>
-    <p:sldId id="272" r:id="rId4"/>
-    <p:sldId id="275" r:id="rId5"/>
-    <p:sldId id="268" r:id="rId6"/>
-    <p:sldId id="258" r:id="rId7"/>
-    <p:sldId id="260" r:id="rId8"/>
-    <p:sldId id="281" r:id="rId9"/>
-    <p:sldId id="285" r:id="rId10"/>
-    <p:sldId id="263" r:id="rId11"/>
-    <p:sldId id="265" r:id="rId12"/>
-    <p:sldId id="280" r:id="rId13"/>
-    <p:sldId id="288" r:id="rId14"/>
-    <p:sldId id="287" r:id="rId15"/>
-    <p:sldId id="289" r:id="rId16"/>
-    <p:sldId id="274" r:id="rId17"/>
-    <p:sldId id="270" r:id="rId18"/>
+    <p:sldId id="275" r:id="rId4"/>
+    <p:sldId id="268" r:id="rId5"/>
+    <p:sldId id="258" r:id="rId6"/>
+    <p:sldId id="260" r:id="rId7"/>
+    <p:sldId id="281" r:id="rId8"/>
+    <p:sldId id="285" r:id="rId9"/>
+    <p:sldId id="263" r:id="rId10"/>
+    <p:sldId id="265" r:id="rId11"/>
+    <p:sldId id="280" r:id="rId12"/>
+    <p:sldId id="288" r:id="rId13"/>
+    <p:sldId id="287" r:id="rId14"/>
+    <p:sldId id="274" r:id="rId15"/>
+    <p:sldId id="270" r:id="rId16"/>
   </p:sldIdLst>
   <p:sldSz cx="9144000" cy="5143500" type="screen16x9"/>
   <p:notesSz cx="6858000" cy="9144000"/>
@@ -130,7 +128,6 @@
           <p14:sldIdLst>
             <p14:sldId id="256"/>
             <p14:sldId id="277"/>
-            <p14:sldId id="272"/>
             <p14:sldId id="275"/>
             <p14:sldId id="268"/>
             <p14:sldId id="258"/>
@@ -142,7 +139,6 @@
             <p14:sldId id="280"/>
             <p14:sldId id="288"/>
             <p14:sldId id="287"/>
-            <p14:sldId id="289"/>
             <p14:sldId id="274"/>
             <p14:sldId id="270"/>
           </p14:sldIdLst>
@@ -572,7 +568,7 @@
           <a:p>
             <a:fld id="{E9B2779C-508E-8444-A7D4-4A51A98516D1}" type="slidenum">
               <a:rPr lang="en-US" smtClean="0"/>
-              <a:t>4</a:t>
+              <a:t>3</a:t>
             </a:fld>
             <a:endParaRPr lang="en-US"/>
           </a:p>
@@ -754,7 +750,7 @@
           <a:p>
             <a:fld id="{8BE62C9E-E039-1D4B-B0DD-27D2F5375E2F}" type="slidenum">
               <a:rPr lang="en-US" smtClean="0"/>
-              <a:t>11</a:t>
+              <a:t>10</a:t>
             </a:fld>
             <a:endParaRPr lang="en-US"/>
           </a:p>
@@ -3851,16 +3847,106 @@
           <a:chExt cx="0" cy="0"/>
         </a:xfrm>
       </p:grpSpPr>
+      <p:sp>
+        <p:nvSpPr>
+          <p:cNvPr id="2" name="Title 1"/>
+          <p:cNvSpPr>
+            <a:spLocks noGrp="1"/>
+          </p:cNvSpPr>
+          <p:nvPr>
+            <p:ph type="title"/>
+          </p:nvPr>
+        </p:nvSpPr>
+        <p:spPr/>
+        <p:txBody>
+          <a:bodyPr>
+            <a:normAutofit/>
+          </a:bodyPr>
+          <a:lstStyle/>
+          <a:p>
+            <a:r>
+              <a:rPr lang="en-US" dirty="0" smtClean="0"/>
+              <a:t>Communication Facts</a:t>
+            </a:r>
+            <a:endParaRPr lang="en-US" dirty="0"/>
+          </a:p>
+        </p:txBody>
+      </p:sp>
+      <p:sp>
+        <p:nvSpPr>
+          <p:cNvPr id="3" name="Content Placeholder 2"/>
+          <p:cNvSpPr>
+            <a:spLocks noGrp="1"/>
+          </p:cNvSpPr>
+          <p:nvPr>
+            <p:ph idx="1"/>
+          </p:nvPr>
+        </p:nvSpPr>
+        <p:spPr>
+          <a:xfrm>
+            <a:off x="457200" y="1200151"/>
+            <a:ext cx="4683276" cy="3394472"/>
+          </a:xfrm>
+        </p:spPr>
+        <p:txBody>
+          <a:bodyPr>
+            <a:normAutofit lnSpcReduction="10000"/>
+          </a:bodyPr>
+          <a:lstStyle/>
+          <a:p>
+            <a:r>
+              <a:rPr lang="en-US" dirty="0" smtClean="0"/>
+              <a:t>Geo 35,786 km, ~240ms</a:t>
+            </a:r>
+          </a:p>
+          <a:p>
+            <a:r>
+              <a:rPr lang="en-US" dirty="0" smtClean="0"/>
+              <a:t>LEO 1,100 km, ~7ms</a:t>
+            </a:r>
+          </a:p>
+          <a:p>
+            <a:endParaRPr lang="en-US" sz="1200" dirty="0" smtClean="0"/>
+          </a:p>
+          <a:p>
+            <a:r>
+              <a:rPr lang="en-US" dirty="0" smtClean="0"/>
+              <a:t>C In Space</a:t>
+            </a:r>
+            <a:endParaRPr lang="en-US" dirty="0"/>
+          </a:p>
+          <a:p>
+            <a:pPr lvl="1"/>
+            <a:r>
+              <a:rPr lang="en-US" dirty="0" smtClean="0"/>
+              <a:t>299793 km/s</a:t>
+            </a:r>
+          </a:p>
+          <a:p>
+            <a:r>
+              <a:rPr lang="en-US" dirty="0" smtClean="0"/>
+              <a:t>C in Glass</a:t>
+            </a:r>
+          </a:p>
+          <a:p>
+            <a:pPr lvl="1"/>
+            <a:r>
+              <a:rPr lang="en-US" dirty="0" smtClean="0"/>
+              <a:t>197231 km/s</a:t>
+            </a:r>
+          </a:p>
+        </p:txBody>
+      </p:sp>
       <p:pic>
         <p:nvPicPr>
-          <p:cNvPr id="5" name="Picture 4" descr="crs6_launch_39a.jpg"/>
+          <p:cNvPr id="4" name="Picture 3" descr="2000px-Comparison_satellite_navigation_orbits.svg.png"/>
           <p:cNvPicPr>
             <a:picLocks noChangeAspect="1"/>
           </p:cNvPicPr>
           <p:nvPr/>
         </p:nvPicPr>
         <p:blipFill>
-          <a:blip r:embed="rId2" cstate="screen">
+          <a:blip r:embed="rId3" cstate="screen">
             <a:extLst>
               <a:ext uri="{28A0092B-C50C-407E-A947-70E740481C1C}">
                 <a14:useLocalDpi xmlns:a14="http://schemas.microsoft.com/office/drawing/2010/main"/>
@@ -3873,8 +3959,8 @@
         </p:blipFill>
         <p:spPr>
           <a:xfrm>
-            <a:off x="0" y="0"/>
-            <a:ext cx="9144000" cy="6096000"/>
+            <a:off x="4995333" y="1200151"/>
+            <a:ext cx="3836912" cy="3836912"/>
           </a:xfrm>
           <a:prstGeom prst="rect">
             <a:avLst/>
@@ -3883,14 +3969,14 @@
       </p:pic>
       <p:sp>
         <p:nvSpPr>
-          <p:cNvPr id="6" name="TextBox 5"/>
+          <p:cNvPr id="5" name="TextBox 4"/>
           <p:cNvSpPr txBox="1"/>
           <p:nvPr/>
         </p:nvSpPr>
         <p:spPr>
           <a:xfrm>
-            <a:off x="0" y="4774168"/>
-            <a:ext cx="2419277" cy="369332"/>
+            <a:off x="7921809" y="4869636"/>
+            <a:ext cx="1222191" cy="261610"/>
           </a:xfrm>
           <a:prstGeom prst="rect">
             <a:avLst/>
@@ -3904,29 +3990,29 @@
           <a:lstStyle/>
           <a:p>
             <a:r>
-              <a:rPr lang="en-US" dirty="0" smtClean="0">
+              <a:rPr lang="en-US" sz="1100" dirty="0" err="1">
                 <a:solidFill>
                   <a:schemeClr val="bg2">
-                    <a:lumMod val="50000"/>
+                    <a:lumMod val="75000"/>
                   </a:schemeClr>
                 </a:solidFill>
               </a:rPr>
-              <a:t>Image from </a:t>
-            </a:r>
-            <a:r>
-              <a:rPr lang="en-US" dirty="0" err="1" smtClean="0">
+              <a:t>W</a:t>
+            </a:r>
+            <a:r>
+              <a:rPr lang="en-US" sz="1100" dirty="0" err="1" smtClean="0">
                 <a:solidFill>
                   <a:schemeClr val="bg2">
-                    <a:lumMod val="50000"/>
+                    <a:lumMod val="75000"/>
                   </a:schemeClr>
                 </a:solidFill>
               </a:rPr>
-              <a:t>spacex.com</a:t>
-            </a:r>
-            <a:endParaRPr lang="en-US" dirty="0">
+              <a:t>ikipedia:Cmglee</a:t>
+            </a:r>
+            <a:endParaRPr lang="en-US" sz="1100" dirty="0">
               <a:solidFill>
                 <a:schemeClr val="bg2">
-                  <a:lumMod val="50000"/>
+                  <a:lumMod val="75000"/>
                 </a:schemeClr>
               </a:solidFill>
             </a:endParaRPr>
@@ -3936,7 +4022,7 @@
     </p:spTree>
     <p:extLst>
       <p:ext uri="{BB962C8B-B14F-4D97-AF65-F5344CB8AC3E}">
-        <p14:creationId xmlns:p14="http://schemas.microsoft.com/office/powerpoint/2010/main" val="3802749253"/>
+        <p14:creationId xmlns:p14="http://schemas.microsoft.com/office/powerpoint/2010/main" val="3355747399"/>
       </p:ext>
     </p:extLst>
   </p:cSld>
@@ -3977,19 +4063,17 @@
             <a:spLocks noGrp="1"/>
           </p:cNvSpPr>
           <p:nvPr>
-            <p:ph type="title"/>
-          </p:nvPr>
-        </p:nvSpPr>
-        <p:spPr/>
-        <p:txBody>
-          <a:bodyPr>
-            <a:normAutofit/>
-          </a:bodyPr>
+            <p:ph type="ctrTitle"/>
+          </p:nvPr>
+        </p:nvSpPr>
+        <p:spPr/>
+        <p:txBody>
+          <a:bodyPr/>
           <a:lstStyle/>
           <a:p>
             <a:r>
               <a:rPr lang="en-US" dirty="0" smtClean="0"/>
-              <a:t>Communication Facts</a:t>
+              <a:t>Predictions &amp; Suggestions</a:t>
             </a:r>
             <a:endParaRPr lang="en-US" dirty="0"/>
           </a:p>
@@ -3997,155 +4081,27 @@
       </p:sp>
       <p:sp>
         <p:nvSpPr>
-          <p:cNvPr id="3" name="Content Placeholder 2"/>
-          <p:cNvSpPr>
-            <a:spLocks noGrp="1"/>
-          </p:cNvSpPr>
-          <p:nvPr>
-            <p:ph idx="1"/>
-          </p:nvPr>
-        </p:nvSpPr>
-        <p:spPr>
-          <a:xfrm>
-            <a:off x="457200" y="1200151"/>
-            <a:ext cx="4683276" cy="3394472"/>
-          </a:xfrm>
-        </p:spPr>
-        <p:txBody>
-          <a:bodyPr>
-            <a:normAutofit lnSpcReduction="10000"/>
-          </a:bodyPr>
-          <a:lstStyle/>
-          <a:p>
-            <a:r>
-              <a:rPr lang="en-US" dirty="0" smtClean="0"/>
-              <a:t>Geo 35,786 km, ~240ms</a:t>
-            </a:r>
-          </a:p>
-          <a:p>
-            <a:r>
-              <a:rPr lang="en-US" dirty="0" smtClean="0"/>
-              <a:t>LEO 1,100 km, ~7ms</a:t>
-            </a:r>
-          </a:p>
-          <a:p>
-            <a:endParaRPr lang="en-US" sz="1200" dirty="0" smtClean="0"/>
-          </a:p>
-          <a:p>
-            <a:r>
-              <a:rPr lang="en-US" dirty="0" smtClean="0"/>
-              <a:t>C In Space</a:t>
-            </a:r>
-            <a:endParaRPr lang="en-US" dirty="0"/>
-          </a:p>
-          <a:p>
-            <a:pPr lvl="1"/>
-            <a:r>
-              <a:rPr lang="en-US" dirty="0" smtClean="0"/>
-              <a:t>299793 km/s</a:t>
-            </a:r>
-          </a:p>
-          <a:p>
-            <a:r>
-              <a:rPr lang="en-US" dirty="0" smtClean="0"/>
-              <a:t>C in Glass</a:t>
-            </a:r>
-          </a:p>
-          <a:p>
-            <a:pPr lvl="1"/>
-            <a:r>
-              <a:rPr lang="en-US" dirty="0" smtClean="0"/>
-              <a:t>197231 km/s</a:t>
-            </a:r>
-          </a:p>
-        </p:txBody>
-      </p:sp>
-      <p:pic>
-        <p:nvPicPr>
-          <p:cNvPr id="4" name="Picture 3" descr="2000px-Comparison_satellite_navigation_orbits.svg.png"/>
-          <p:cNvPicPr>
-            <a:picLocks noChangeAspect="1"/>
-          </p:cNvPicPr>
-          <p:nvPr/>
-        </p:nvPicPr>
-        <p:blipFill>
-          <a:blip r:embed="rId3" cstate="screen">
-            <a:extLst>
-              <a:ext uri="{28A0092B-C50C-407E-A947-70E740481C1C}">
-                <a14:useLocalDpi xmlns:a14="http://schemas.microsoft.com/office/drawing/2010/main"/>
-              </a:ext>
-            </a:extLst>
-          </a:blip>
-          <a:stretch>
-            <a:fillRect/>
-          </a:stretch>
-        </p:blipFill>
-        <p:spPr>
-          <a:xfrm>
-            <a:off x="4995333" y="1200151"/>
-            <a:ext cx="3836912" cy="3836912"/>
-          </a:xfrm>
-          <a:prstGeom prst="rect">
-            <a:avLst/>
-          </a:prstGeom>
-        </p:spPr>
-      </p:pic>
-      <p:sp>
-        <p:nvSpPr>
-          <p:cNvPr id="5" name="TextBox 4"/>
-          <p:cNvSpPr txBox="1"/>
-          <p:nvPr/>
-        </p:nvSpPr>
-        <p:spPr>
-          <a:xfrm>
-            <a:off x="7921809" y="4869636"/>
-            <a:ext cx="1222191" cy="261610"/>
-          </a:xfrm>
-          <a:prstGeom prst="rect">
-            <a:avLst/>
-          </a:prstGeom>
-          <a:noFill/>
-        </p:spPr>
-        <p:txBody>
-          <a:bodyPr wrap="none" rtlCol="0">
-            <a:spAutoFit/>
-          </a:bodyPr>
-          <a:lstStyle/>
-          <a:p>
-            <a:r>
-              <a:rPr lang="en-US" sz="1100" dirty="0" err="1">
-                <a:solidFill>
-                  <a:schemeClr val="bg2">
-                    <a:lumMod val="75000"/>
-                  </a:schemeClr>
-                </a:solidFill>
-              </a:rPr>
-              <a:t>W</a:t>
-            </a:r>
-            <a:r>
-              <a:rPr lang="en-US" sz="1100" dirty="0" err="1" smtClean="0">
-                <a:solidFill>
-                  <a:schemeClr val="bg2">
-                    <a:lumMod val="75000"/>
-                  </a:schemeClr>
-                </a:solidFill>
-              </a:rPr>
-              <a:t>ikipedia:Cmglee</a:t>
-            </a:r>
-            <a:endParaRPr lang="en-US" sz="1100" dirty="0">
-              <a:solidFill>
-                <a:schemeClr val="bg2">
-                  <a:lumMod val="75000"/>
-                </a:schemeClr>
-              </a:solidFill>
-            </a:endParaRPr>
+          <p:cNvPr id="4" name="Subtitle 3"/>
+          <p:cNvSpPr>
+            <a:spLocks noGrp="1"/>
+          </p:cNvSpPr>
+          <p:nvPr>
+            <p:ph type="subTitle" idx="1"/>
+          </p:nvPr>
+        </p:nvSpPr>
+        <p:spPr/>
+        <p:txBody>
+          <a:bodyPr/>
+          <a:lstStyle/>
+          <a:p>
+            <a:endParaRPr lang="en-US"/>
           </a:p>
         </p:txBody>
       </p:sp>
     </p:spTree>
     <p:extLst>
       <p:ext uri="{BB962C8B-B14F-4D97-AF65-F5344CB8AC3E}">
-        <p14:creationId xmlns:p14="http://schemas.microsoft.com/office/powerpoint/2010/main" val="3355747399"/>
+        <p14:creationId xmlns:p14="http://schemas.microsoft.com/office/powerpoint/2010/main" val="163499639"/>
       </p:ext>
     </p:extLst>
   </p:cSld>
@@ -4186,7 +4142,7 @@
             <a:spLocks noGrp="1"/>
           </p:cNvSpPr>
           <p:nvPr>
-            <p:ph type="ctrTitle"/>
+            <p:ph type="title"/>
           </p:nvPr>
         </p:nvSpPr>
         <p:spPr/>
@@ -4196,7 +4152,7 @@
           <a:p>
             <a:r>
               <a:rPr lang="en-US" dirty="0" smtClean="0"/>
-              <a:t>Predictions &amp; Suggestions</a:t>
+              <a:t>Larger audiences than ever</a:t>
             </a:r>
             <a:endParaRPr lang="en-US" dirty="0"/>
           </a:p>
@@ -4204,40 +4160,87 @@
       </p:sp>
       <p:sp>
         <p:nvSpPr>
-          <p:cNvPr id="4" name="Subtitle 3"/>
-          <p:cNvSpPr>
-            <a:spLocks noGrp="1"/>
-          </p:cNvSpPr>
-          <p:nvPr>
-            <p:ph type="subTitle" idx="1"/>
-          </p:nvPr>
-        </p:nvSpPr>
-        <p:spPr/>
-        <p:txBody>
-          <a:bodyPr/>
-          <a:lstStyle/>
-          <a:p>
-            <a:endParaRPr lang="en-US"/>
+          <p:cNvPr id="3" name="Content Placeholder 2"/>
+          <p:cNvSpPr>
+            <a:spLocks noGrp="1"/>
+          </p:cNvSpPr>
+          <p:nvPr>
+            <p:ph idx="1"/>
+          </p:nvPr>
+        </p:nvSpPr>
+        <p:spPr/>
+        <p:txBody>
+          <a:bodyPr>
+            <a:normAutofit lnSpcReduction="10000"/>
+          </a:bodyPr>
+          <a:lstStyle/>
+          <a:p>
+            <a:r>
+              <a:rPr lang="en-US" dirty="0" smtClean="0"/>
+              <a:t>Hardware costs dropping</a:t>
+            </a:r>
+          </a:p>
+          <a:p>
+            <a:pPr lvl="1"/>
+            <a:r>
+              <a:rPr lang="en-US" dirty="0" smtClean="0"/>
+              <a:t>Due to </a:t>
+            </a:r>
+            <a:r>
+              <a:rPr lang="en-US" dirty="0"/>
+              <a:t>E</a:t>
+            </a:r>
+            <a:r>
+              <a:rPr lang="en-US" dirty="0" smtClean="0"/>
+              <a:t>&amp;D from phone manufacturing</a:t>
+            </a:r>
+            <a:endParaRPr lang="en-US" sz="800" dirty="0" smtClean="0"/>
+          </a:p>
+          <a:p>
+            <a:r>
+              <a:rPr lang="en-US" dirty="0" smtClean="0"/>
+              <a:t>Universal network access</a:t>
+            </a:r>
+          </a:p>
+          <a:p>
+            <a:pPr lvl="1"/>
+            <a:r>
+              <a:rPr lang="en-US" dirty="0" smtClean="0"/>
+              <a:t>Cellular already reaching remote regions</a:t>
+            </a:r>
+          </a:p>
+          <a:p>
+            <a:pPr lvl="1"/>
+            <a:r>
+              <a:rPr lang="en-US" dirty="0" smtClean="0"/>
+              <a:t>Satellite will enable true global reach</a:t>
+            </a:r>
+          </a:p>
+          <a:p>
+            <a:pPr lvl="1"/>
+            <a:endParaRPr lang="en-US" sz="900" dirty="0" smtClean="0"/>
+          </a:p>
+          <a:p>
+            <a:pPr marL="0" indent="0">
+              <a:buNone/>
+            </a:pPr>
+            <a:r>
+              <a:rPr lang="en-US" dirty="0" smtClean="0"/>
+              <a:t>-&gt; Rethink distribution strategies</a:t>
+            </a:r>
           </a:p>
         </p:txBody>
       </p:sp>
     </p:spTree>
     <p:extLst>
       <p:ext uri="{BB962C8B-B14F-4D97-AF65-F5344CB8AC3E}">
-        <p14:creationId xmlns:p14="http://schemas.microsoft.com/office/powerpoint/2010/main" val="163499639"/>
+        <p14:creationId xmlns:p14="http://schemas.microsoft.com/office/powerpoint/2010/main" val="4289493255"/>
       </p:ext>
     </p:extLst>
   </p:cSld>
   <p:clrMapOvr>
     <a:masterClrMapping/>
   </p:clrMapOvr>
-  <p:timing>
-    <p:tnLst>
-      <p:par>
-        <p:cTn xmlns:p14="http://schemas.microsoft.com/office/powerpoint/2010/main" id="1" dur="indefinite" restart="never" nodeType="tmRoot"/>
-      </p:par>
-    </p:tnLst>
-  </p:timing>
 </p:sld>
 </file>
 
@@ -4275,7 +4278,7 @@
           <a:p>
             <a:r>
               <a:rPr lang="en-US" dirty="0" smtClean="0"/>
-              <a:t>Larger audiences than ever</a:t>
+              <a:t>Access is gated by Art</a:t>
             </a:r>
             <a:endParaRPr lang="en-US" dirty="0"/>
           </a:p>
@@ -4294,70 +4297,77 @@
         <p:spPr/>
         <p:txBody>
           <a:bodyPr>
-            <a:normAutofit lnSpcReduction="10000"/>
+            <a:normAutofit fontScale="92500" lnSpcReduction="10000"/>
           </a:bodyPr>
           <a:lstStyle/>
           <a:p>
             <a:r>
               <a:rPr lang="en-US" dirty="0" smtClean="0"/>
-              <a:t>Hardware costs dropping</a:t>
-            </a:r>
-          </a:p>
-          <a:p>
-            <a:pPr lvl="1"/>
+              <a:t>Art is the biggest risk to developing your game</a:t>
+            </a:r>
+          </a:p>
+          <a:p>
+            <a:r>
+              <a:rPr lang="en-US" dirty="0"/>
+              <a:t>A</a:t>
+            </a:r>
             <a:r>
               <a:rPr lang="en-US" dirty="0" smtClean="0"/>
-              <a:t>Due to </a:t>
-            </a:r>
+              <a:t>rt drives the cost for marginal users</a:t>
+            </a:r>
+          </a:p>
+          <a:p>
+            <a:endParaRPr lang="en-US" sz="900" dirty="0" smtClean="0"/>
+          </a:p>
+          <a:p>
+            <a:pPr marL="0" indent="0">
+              <a:buNone/>
+            </a:pPr>
+            <a:r>
+              <a:rPr lang="en-US" dirty="0" smtClean="0"/>
+              <a:t>-&gt; Focus team on minimizing art size</a:t>
+            </a:r>
+          </a:p>
+          <a:p>
+            <a:pPr marL="0" indent="0">
+              <a:buNone/>
+            </a:pPr>
+            <a:r>
+              <a:rPr lang="en-US" dirty="0" smtClean="0"/>
+              <a:t>-&gt; Invest in art size reduction technologies</a:t>
+            </a:r>
+          </a:p>
+          <a:p>
+            <a:pPr marL="0" indent="0">
+              <a:buNone/>
+            </a:pPr>
             <a:r>
               <a:rPr lang="en-US" dirty="0"/>
-              <a:t>E</a:t>
-            </a:r>
+              <a:t>	</a:t>
+            </a:r>
+            <a:r>
+              <a:rPr lang="en-US" sz="2800" dirty="0" smtClean="0"/>
+              <a:t>-&gt; linkers, compressors, computed art</a:t>
+            </a:r>
+          </a:p>
+          <a:p>
+            <a:pPr marL="0" indent="0">
+              <a:buNone/>
+            </a:pPr>
             <a:r>
               <a:rPr lang="en-US" dirty="0" smtClean="0"/>
-              <a:t>&amp;D from phone manufacturing</a:t>
-            </a:r>
-            <a:endParaRPr lang="en-US" sz="800" dirty="0" smtClean="0"/>
-          </a:p>
-          <a:p>
-            <a:r>
-              <a:rPr lang="en-US" dirty="0" smtClean="0"/>
-              <a:t>Universal network access</a:t>
-            </a:r>
-          </a:p>
-          <a:p>
-            <a:pPr lvl="1"/>
-            <a:r>
-              <a:rPr lang="en-US" dirty="0" smtClean="0"/>
-              <a:t>Cellular already reaching remote regions</a:t>
-            </a:r>
-          </a:p>
-          <a:p>
-            <a:pPr lvl="1"/>
-            <a:r>
-              <a:rPr lang="en-US" dirty="0" smtClean="0"/>
-              <a:t>Satellite will enable true global reach</a:t>
-            </a:r>
-          </a:p>
-          <a:p>
-            <a:pPr lvl="1"/>
-            <a:endParaRPr lang="en-US" sz="900" dirty="0" smtClean="0"/>
-          </a:p>
-          <a:p>
-            <a:pPr marL="0" indent="0">
-              <a:buNone/>
-            </a:pPr>
-            <a:r>
-              <a:rPr lang="en-US" dirty="0" smtClean="0"/>
-              <a:t>-&gt; Rethink distribution strategies</a:t>
-            </a:r>
+              <a:t>-&gt; Take advantage of distribution caching</a:t>
+            </a:r>
+          </a:p>
+          <a:p>
+            <a:endParaRPr lang="en-US" dirty="0"/>
           </a:p>
         </p:txBody>
       </p:sp>
     </p:spTree>
     <p:extLst>
       <p:ext uri="{BB962C8B-B14F-4D97-AF65-F5344CB8AC3E}">
-        <p14:creationId xmlns:p14="http://schemas.microsoft.com/office/powerpoint/2010/main" val="4289493255"/>
+        <p14:creationId xmlns:p14="http://schemas.microsoft.com/office/powerpoint/2010/main" val="154262117"/>
       </p:ext>
     </p:extLst>
   </p:cSld>
@@ -4401,259 +4411,6 @@
           <a:p>
             <a:r>
               <a:rPr lang="en-US" dirty="0" smtClean="0"/>
-              <a:t>Access is gated by Art</a:t>
-            </a:r>
-            <a:endParaRPr lang="en-US" dirty="0"/>
-          </a:p>
-        </p:txBody>
-      </p:sp>
-      <p:sp>
-        <p:nvSpPr>
-          <p:cNvPr id="3" name="Content Placeholder 2"/>
-          <p:cNvSpPr>
-            <a:spLocks noGrp="1"/>
-          </p:cNvSpPr>
-          <p:nvPr>
-            <p:ph idx="1"/>
-          </p:nvPr>
-        </p:nvSpPr>
-        <p:spPr/>
-        <p:txBody>
-          <a:bodyPr>
-            <a:normAutofit fontScale="92500" lnSpcReduction="10000"/>
-          </a:bodyPr>
-          <a:lstStyle/>
-          <a:p>
-            <a:r>
-              <a:rPr lang="en-US" dirty="0" smtClean="0"/>
-              <a:t>Art is the biggest risk to developing your game</a:t>
-            </a:r>
-          </a:p>
-          <a:p>
-            <a:r>
-              <a:rPr lang="en-US" dirty="0"/>
-              <a:t>A</a:t>
-            </a:r>
-            <a:r>
-              <a:rPr lang="en-US" dirty="0" smtClean="0"/>
-              <a:t>rt drives the cost for marginal users</a:t>
-            </a:r>
-          </a:p>
-          <a:p>
-            <a:endParaRPr lang="en-US" sz="900" dirty="0" smtClean="0"/>
-          </a:p>
-          <a:p>
-            <a:pPr marL="0" indent="0">
-              <a:buNone/>
-            </a:pPr>
-            <a:r>
-              <a:rPr lang="en-US" dirty="0" smtClean="0"/>
-              <a:t>-&gt; Focus team on minimizing art size</a:t>
-            </a:r>
-          </a:p>
-          <a:p>
-            <a:pPr marL="0" indent="0">
-              <a:buNone/>
-            </a:pPr>
-            <a:r>
-              <a:rPr lang="en-US" dirty="0" smtClean="0"/>
-              <a:t>-&gt; Invest in art size reduction technologies</a:t>
-            </a:r>
-          </a:p>
-          <a:p>
-            <a:pPr marL="0" indent="0">
-              <a:buNone/>
-            </a:pPr>
-            <a:r>
-              <a:rPr lang="en-US" dirty="0"/>
-              <a:t>	</a:t>
-            </a:r>
-            <a:r>
-              <a:rPr lang="en-US" sz="2800" dirty="0" smtClean="0"/>
-              <a:t>-&gt; linkers, compressors, computed art</a:t>
-            </a:r>
-          </a:p>
-          <a:p>
-            <a:pPr marL="0" indent="0">
-              <a:buNone/>
-            </a:pPr>
-            <a:r>
-              <a:rPr lang="en-US" dirty="0" smtClean="0"/>
-              <a:t>-&gt; Take advantage of distribution caching</a:t>
-            </a:r>
-          </a:p>
-          <a:p>
-            <a:endParaRPr lang="en-US" dirty="0"/>
-          </a:p>
-        </p:txBody>
-      </p:sp>
-    </p:spTree>
-    <p:extLst>
-      <p:ext uri="{BB962C8B-B14F-4D97-AF65-F5344CB8AC3E}">
-        <p14:creationId xmlns:p14="http://schemas.microsoft.com/office/powerpoint/2010/main" val="154262117"/>
-      </p:ext>
-    </p:extLst>
-  </p:cSld>
-  <p:clrMapOvr>
-    <a:masterClrMapping/>
-  </p:clrMapOvr>
-</p:sld>
-</file>
-
-<file path=ppt/slides/slide15.xml><?xml version="1.0" encoding="utf-8"?>
-<p:sld xmlns:a="http://schemas.openxmlformats.org/drawingml/2006/main" xmlns:r="http://schemas.openxmlformats.org/officeDocument/2006/relationships" xmlns:p="http://schemas.openxmlformats.org/presentationml/2006/main">
-  <p:cSld>
-    <p:spTree>
-      <p:nvGrpSpPr>
-        <p:cNvPr id="1" name=""/>
-        <p:cNvGrpSpPr/>
-        <p:nvPr/>
-      </p:nvGrpSpPr>
-      <p:grpSpPr>
-        <a:xfrm>
-          <a:off x="0" y="0"/>
-          <a:ext cx="0" cy="0"/>
-          <a:chOff x="0" y="0"/>
-          <a:chExt cx="0" cy="0"/>
-        </a:xfrm>
-      </p:grpSpPr>
-      <p:sp>
-        <p:nvSpPr>
-          <p:cNvPr id="2" name="Title 1"/>
-          <p:cNvSpPr>
-            <a:spLocks noGrp="1"/>
-          </p:cNvSpPr>
-          <p:nvPr>
-            <p:ph type="title"/>
-          </p:nvPr>
-        </p:nvSpPr>
-        <p:spPr/>
-        <p:txBody>
-          <a:bodyPr/>
-          <a:lstStyle/>
-          <a:p>
-            <a:r>
-              <a:rPr lang="en-US" dirty="0" smtClean="0"/>
-              <a:t>Development Everywhere</a:t>
-            </a:r>
-            <a:endParaRPr lang="en-US" dirty="0"/>
-          </a:p>
-        </p:txBody>
-      </p:sp>
-      <p:sp>
-        <p:nvSpPr>
-          <p:cNvPr id="3" name="Content Placeholder 2"/>
-          <p:cNvSpPr>
-            <a:spLocks noGrp="1"/>
-          </p:cNvSpPr>
-          <p:nvPr>
-            <p:ph idx="1"/>
-          </p:nvPr>
-        </p:nvSpPr>
-        <p:spPr/>
-        <p:txBody>
-          <a:bodyPr/>
-          <a:lstStyle/>
-          <a:p>
-            <a:r>
-              <a:rPr lang="en-US" dirty="0" smtClean="0"/>
-              <a:t>Game development moves to the cloud</a:t>
-            </a:r>
-          </a:p>
-          <a:p>
-            <a:r>
-              <a:rPr lang="en-US" dirty="0" smtClean="0"/>
-              <a:t>Advantages of local-development diminish</a:t>
-            </a:r>
-          </a:p>
-          <a:p>
-            <a:endParaRPr lang="en-US" sz="800" dirty="0" smtClean="0"/>
-          </a:p>
-          <a:p>
-            <a:pPr marL="0" indent="0">
-              <a:buNone/>
-            </a:pPr>
-            <a:r>
-              <a:rPr lang="en-US" dirty="0" smtClean="0"/>
-              <a:t>-&gt; Redesign content pipeline as server-only tool</a:t>
-            </a:r>
-          </a:p>
-          <a:p>
-            <a:pPr marL="0" indent="0">
-              <a:buNone/>
-            </a:pPr>
-            <a:r>
-              <a:rPr lang="en-US" dirty="0" smtClean="0"/>
-              <a:t>-&gt; Stream </a:t>
-            </a:r>
-            <a:r>
-              <a:rPr lang="en-US" dirty="0" err="1" smtClean="0"/>
-              <a:t>dev</a:t>
-            </a:r>
-            <a:r>
-              <a:rPr lang="en-US" dirty="0" smtClean="0"/>
-              <a:t> tools (better than the game)</a:t>
-            </a:r>
-          </a:p>
-          <a:p>
-            <a:pPr marL="0" indent="0">
-              <a:buNone/>
-            </a:pPr>
-            <a:r>
-              <a:rPr lang="en-US" dirty="0" smtClean="0"/>
-              <a:t>-&gt; Opens new development centers</a:t>
-            </a:r>
-            <a:endParaRPr lang="en-US" dirty="0"/>
-          </a:p>
-        </p:txBody>
-      </p:sp>
-    </p:spTree>
-    <p:extLst>
-      <p:ext uri="{BB962C8B-B14F-4D97-AF65-F5344CB8AC3E}">
-        <p14:creationId xmlns:p14="http://schemas.microsoft.com/office/powerpoint/2010/main" val="2002155517"/>
-      </p:ext>
-    </p:extLst>
-  </p:cSld>
-  <p:clrMapOvr>
-    <a:masterClrMapping/>
-  </p:clrMapOvr>
-</p:sld>
-</file>
-
-<file path=ppt/slides/slide16.xml><?xml version="1.0" encoding="utf-8"?>
-<p:sld xmlns:a="http://schemas.openxmlformats.org/drawingml/2006/main" xmlns:r="http://schemas.openxmlformats.org/officeDocument/2006/relationships" xmlns:p="http://schemas.openxmlformats.org/presentationml/2006/main">
-  <p:cSld>
-    <p:spTree>
-      <p:nvGrpSpPr>
-        <p:cNvPr id="1" name=""/>
-        <p:cNvGrpSpPr/>
-        <p:nvPr/>
-      </p:nvGrpSpPr>
-      <p:grpSpPr>
-        <a:xfrm>
-          <a:off x="0" y="0"/>
-          <a:ext cx="0" cy="0"/>
-          <a:chOff x="0" y="0"/>
-          <a:chExt cx="0" cy="0"/>
-        </a:xfrm>
-      </p:grpSpPr>
-      <p:sp>
-        <p:nvSpPr>
-          <p:cNvPr id="2" name="Title 1"/>
-          <p:cNvSpPr>
-            <a:spLocks noGrp="1"/>
-          </p:cNvSpPr>
-          <p:nvPr>
-            <p:ph type="title"/>
-          </p:nvPr>
-        </p:nvSpPr>
-        <p:spPr/>
-        <p:txBody>
-          <a:bodyPr/>
-          <a:lstStyle/>
-          <a:p>
-            <a:r>
-              <a:rPr lang="en-US" dirty="0" smtClean="0"/>
               <a:t>Wrapping up</a:t>
             </a:r>
             <a:endParaRPr lang="en-US" dirty="0"/>
@@ -4730,7 +4487,7 @@
 </p:sld>
 </file>
 
-<file path=ppt/slides/slide17.xml><?xml version="1.0" encoding="utf-8"?>
+<file path=ppt/slides/slide15.xml><?xml version="1.0" encoding="utf-8"?>
 <p:sld xmlns:a="http://schemas.openxmlformats.org/drawingml/2006/main" xmlns:r="http://schemas.openxmlformats.org/officeDocument/2006/relationships" xmlns:p="http://schemas.openxmlformats.org/presentationml/2006/main">
   <p:cSld>
     <p:spTree>
@@ -5209,98 +4966,6 @@
         </p:nvSpPr>
         <p:spPr/>
         <p:txBody>
-          <a:bodyPr>
-            <a:normAutofit/>
-          </a:bodyPr>
-          <a:lstStyle/>
-          <a:p>
-            <a:r>
-              <a:rPr lang="en-US" dirty="0" smtClean="0"/>
-              <a:t>Pattern</a:t>
-            </a:r>
-            <a:endParaRPr lang="en-US" dirty="0"/>
-          </a:p>
-        </p:txBody>
-      </p:sp>
-      <p:pic>
-        <p:nvPicPr>
-          <p:cNvPr id="4" name="Picture 3" descr="Picture2.png"/>
-          <p:cNvPicPr>
-            <a:picLocks noChangeAspect="1"/>
-          </p:cNvPicPr>
-          <p:nvPr/>
-        </p:nvPicPr>
-        <p:blipFill>
-          <a:blip r:embed="rId2">
-            <a:extLst>
-              <a:ext uri="{28A0092B-C50C-407E-A947-70E740481C1C}">
-                <a14:useLocalDpi xmlns:a14="http://schemas.microsoft.com/office/drawing/2010/main" val="0"/>
-              </a:ext>
-            </a:extLst>
-          </a:blip>
-          <a:stretch>
-            <a:fillRect/>
-          </a:stretch>
-        </p:blipFill>
-        <p:spPr>
-          <a:xfrm>
-            <a:off x="938384" y="1297731"/>
-            <a:ext cx="7267232" cy="2894780"/>
-          </a:xfrm>
-          <a:prstGeom prst="rect">
-            <a:avLst/>
-          </a:prstGeom>
-        </p:spPr>
-      </p:pic>
-    </p:spTree>
-    <p:extLst>
-      <p:ext uri="{BB962C8B-B14F-4D97-AF65-F5344CB8AC3E}">
-        <p14:creationId xmlns:p14="http://schemas.microsoft.com/office/powerpoint/2010/main" val="1309827627"/>
-      </p:ext>
-    </p:extLst>
-  </p:cSld>
-  <p:clrMapOvr>
-    <a:masterClrMapping/>
-  </p:clrMapOvr>
-  <p:timing>
-    <p:tnLst>
-      <p:par>
-        <p:cTn xmlns:p14="http://schemas.microsoft.com/office/powerpoint/2010/main" id="1" dur="indefinite" restart="never" nodeType="tmRoot"/>
-      </p:par>
-    </p:tnLst>
-  </p:timing>
-</p:sld>
-</file>
-
-<file path=ppt/slides/slide4.xml><?xml version="1.0" encoding="utf-8"?>
-<p:sld xmlns:a="http://schemas.openxmlformats.org/drawingml/2006/main" xmlns:r="http://schemas.openxmlformats.org/officeDocument/2006/relationships" xmlns:p="http://schemas.openxmlformats.org/presentationml/2006/main">
-  <p:cSld>
-    <p:spTree>
-      <p:nvGrpSpPr>
-        <p:cNvPr id="1" name=""/>
-        <p:cNvGrpSpPr/>
-        <p:nvPr/>
-      </p:nvGrpSpPr>
-      <p:grpSpPr>
-        <a:xfrm>
-          <a:off x="0" y="0"/>
-          <a:ext cx="0" cy="0"/>
-          <a:chOff x="0" y="0"/>
-          <a:chExt cx="0" cy="0"/>
-        </a:xfrm>
-      </p:grpSpPr>
-      <p:sp>
-        <p:nvSpPr>
-          <p:cNvPr id="2" name="Title 1"/>
-          <p:cNvSpPr>
-            <a:spLocks noGrp="1"/>
-          </p:cNvSpPr>
-          <p:nvPr>
-            <p:ph type="title"/>
-          </p:nvPr>
-        </p:nvSpPr>
-        <p:spPr/>
-        <p:txBody>
           <a:bodyPr/>
           <a:lstStyle/>
           <a:p>
@@ -5500,7 +5165,7 @@
 </p:sld>
 </file>
 
-<file path=ppt/slides/slide5.xml><?xml version="1.0" encoding="utf-8"?>
+<file path=ppt/slides/slide4.xml><?xml version="1.0" encoding="utf-8"?>
 <p:sld xmlns:a="http://schemas.openxmlformats.org/drawingml/2006/main" xmlns:r="http://schemas.openxmlformats.org/officeDocument/2006/relationships" xmlns:p="http://schemas.openxmlformats.org/presentationml/2006/main">
   <p:cSld>
     <p:spTree>
@@ -5579,7 +5244,7 @@
 </p:sld>
 </file>
 
-<file path=ppt/slides/slide6.xml><?xml version="1.0" encoding="utf-8"?>
+<file path=ppt/slides/slide5.xml><?xml version="1.0" encoding="utf-8"?>
 <p:sld xmlns:a="http://schemas.openxmlformats.org/drawingml/2006/main" xmlns:r="http://schemas.openxmlformats.org/officeDocument/2006/relationships" xmlns:p="http://schemas.openxmlformats.org/presentationml/2006/main">
   <p:cSld>
     <p:spTree>
@@ -5669,7 +5334,7 @@
 </p:sld>
 </file>
 
-<file path=ppt/slides/slide7.xml><?xml version="1.0" encoding="utf-8"?>
+<file path=ppt/slides/slide6.xml><?xml version="1.0" encoding="utf-8"?>
 <p:sld xmlns:a="http://schemas.openxmlformats.org/drawingml/2006/main" xmlns:r="http://schemas.openxmlformats.org/officeDocument/2006/relationships" xmlns:p="http://schemas.openxmlformats.org/presentationml/2006/main">
   <p:cSld>
     <p:spTree>
@@ -5817,7 +5482,7 @@
 </p:sld>
 </file>
 
-<file path=ppt/slides/slide8.xml><?xml version="1.0" encoding="utf-8"?>
+<file path=ppt/slides/slide7.xml><?xml version="1.0" encoding="utf-8"?>
 <p:sld xmlns:a="http://schemas.openxmlformats.org/drawingml/2006/main" xmlns:r="http://schemas.openxmlformats.org/officeDocument/2006/relationships" xmlns:p="http://schemas.openxmlformats.org/presentationml/2006/main">
   <p:cSld>
     <p:spTree>
@@ -5945,6 +5610,119 @@
 </p:sld>
 </file>
 
+<file path=ppt/slides/slide8.xml><?xml version="1.0" encoding="utf-8"?>
+<p:sld xmlns:a="http://schemas.openxmlformats.org/drawingml/2006/main" xmlns:r="http://schemas.openxmlformats.org/officeDocument/2006/relationships" xmlns:p="http://schemas.openxmlformats.org/presentationml/2006/main">
+  <p:cSld>
+    <p:spTree>
+      <p:nvGrpSpPr>
+        <p:cNvPr id="1" name=""/>
+        <p:cNvGrpSpPr/>
+        <p:nvPr/>
+      </p:nvGrpSpPr>
+      <p:grpSpPr>
+        <a:xfrm>
+          <a:off x="0" y="0"/>
+          <a:ext cx="0" cy="0"/>
+          <a:chOff x="0" y="0"/>
+          <a:chExt cx="0" cy="0"/>
+        </a:xfrm>
+      </p:grpSpPr>
+      <p:sp>
+        <p:nvSpPr>
+          <p:cNvPr id="2" name="Title 1"/>
+          <p:cNvSpPr>
+            <a:spLocks noGrp="1"/>
+          </p:cNvSpPr>
+          <p:nvPr>
+            <p:ph type="title"/>
+          </p:nvPr>
+        </p:nvSpPr>
+        <p:spPr/>
+        <p:txBody>
+          <a:bodyPr/>
+          <a:lstStyle/>
+          <a:p>
+            <a:r>
+              <a:rPr lang="en-US" dirty="0" smtClean="0"/>
+              <a:t>Emerging World Tech</a:t>
+            </a:r>
+            <a:endParaRPr lang="en-US" dirty="0"/>
+          </a:p>
+        </p:txBody>
+      </p:sp>
+      <p:sp>
+        <p:nvSpPr>
+          <p:cNvPr id="3" name="Content Placeholder 2"/>
+          <p:cNvSpPr>
+            <a:spLocks noGrp="1"/>
+          </p:cNvSpPr>
+          <p:nvPr>
+            <p:ph idx="1"/>
+          </p:nvPr>
+        </p:nvSpPr>
+        <p:spPr/>
+        <p:txBody>
+          <a:bodyPr>
+            <a:normAutofit/>
+          </a:bodyPr>
+          <a:lstStyle/>
+          <a:p>
+            <a:r>
+              <a:rPr lang="en-US" dirty="0" smtClean="0"/>
+              <a:t>New audiences going straight to wireless</a:t>
+            </a:r>
+          </a:p>
+          <a:p>
+            <a:r>
+              <a:rPr lang="en-US" dirty="0" smtClean="0"/>
+              <a:t>Users pay for data outside game ecosystem</a:t>
+            </a:r>
+          </a:p>
+          <a:p>
+            <a:endParaRPr lang="en-US" sz="800" dirty="0" smtClean="0"/>
+          </a:p>
+          <a:p>
+            <a:r>
+              <a:rPr lang="en-US" dirty="0" smtClean="0"/>
+              <a:t>Cost of data is significant</a:t>
+            </a:r>
+          </a:p>
+          <a:p>
+            <a:pPr lvl="1"/>
+            <a:r>
+              <a:rPr lang="en-US" dirty="0" smtClean="0"/>
+              <a:t>Can easily cost as much as the original game</a:t>
+            </a:r>
+          </a:p>
+          <a:p>
+            <a:pPr lvl="1"/>
+            <a:endParaRPr lang="en-US" sz="800" dirty="0"/>
+          </a:p>
+          <a:p>
+            <a:r>
+              <a:rPr lang="en-US" sz="4000" dirty="0" smtClean="0"/>
+              <a:t>Total Cost of Gaming</a:t>
+            </a:r>
+          </a:p>
+          <a:p>
+            <a:pPr lvl="1"/>
+            <a:endParaRPr lang="en-US" dirty="0"/>
+          </a:p>
+        </p:txBody>
+      </p:sp>
+    </p:spTree>
+    <p:extLst>
+      <p:ext uri="{BB962C8B-B14F-4D97-AF65-F5344CB8AC3E}">
+        <p14:creationId xmlns:p14="http://schemas.microsoft.com/office/powerpoint/2010/main" val="3597403837"/>
+      </p:ext>
+    </p:extLst>
+  </p:cSld>
+  <p:clrMapOvr>
+    <a:masterClrMapping/>
+  </p:clrMapOvr>
+</p:sld>
+</file>
+
 <file path=ppt/slides/slide9.xml><?xml version="1.0" encoding="utf-8"?>
 <p:sld xmlns:a="http://schemas.openxmlformats.org/drawingml/2006/main" xmlns:r="http://schemas.openxmlformats.org/officeDocument/2006/relationships" xmlns:p="http://schemas.openxmlformats.org/presentationml/2006/main">
   <p:cSld>
@@ -5962,99 +5740,105 @@
           <a:chExt cx="0" cy="0"/>
         </a:xfrm>
       </p:grpSpPr>
-      <p:sp>
-        <p:nvSpPr>
-          <p:cNvPr id="2" name="Title 1"/>
-          <p:cNvSpPr>
-            <a:spLocks noGrp="1"/>
-          </p:cNvSpPr>
-          <p:nvPr>
-            <p:ph type="title"/>
-          </p:nvPr>
-        </p:nvSpPr>
-        <p:spPr/>
-        <p:txBody>
-          <a:bodyPr/>
-          <a:lstStyle/>
-          <a:p>
-            <a:r>
-              <a:rPr lang="en-US" dirty="0" smtClean="0"/>
-              <a:t>Emerging World Tech</a:t>
-            </a:r>
-            <a:endParaRPr lang="en-US" dirty="0"/>
-          </a:p>
-        </p:txBody>
-      </p:sp>
-      <p:sp>
-        <p:nvSpPr>
-          <p:cNvPr id="3" name="Content Placeholder 2"/>
-          <p:cNvSpPr>
-            <a:spLocks noGrp="1"/>
-          </p:cNvSpPr>
-          <p:nvPr>
-            <p:ph idx="1"/>
-          </p:nvPr>
-        </p:nvSpPr>
-        <p:spPr/>
-        <p:txBody>
-          <a:bodyPr>
-            <a:normAutofit/>
+      <p:pic>
+        <p:nvPicPr>
+          <p:cNvPr id="5" name="Picture 4" descr="crs6_launch_39a.jpg"/>
+          <p:cNvPicPr>
+            <a:picLocks noChangeAspect="1"/>
+          </p:cNvPicPr>
+          <p:nvPr/>
+        </p:nvPicPr>
+        <p:blipFill>
+          <a:blip r:embed="rId2" cstate="screen">
+            <a:extLst>
+              <a:ext uri="{28A0092B-C50C-407E-A947-70E740481C1C}">
+                <a14:useLocalDpi xmlns:a14="http://schemas.microsoft.com/office/drawing/2010/main"/>
+              </a:ext>
+            </a:extLst>
+          </a:blip>
+          <a:stretch>
+            <a:fillRect/>
+          </a:stretch>
+        </p:blipFill>
+        <p:spPr>
+          <a:xfrm>
+            <a:off x="0" y="0"/>
+            <a:ext cx="9144000" cy="6096000"/>
+          </a:xfrm>
+          <a:prstGeom prst="rect">
+            <a:avLst/>
+          </a:prstGeom>
+        </p:spPr>
+      </p:pic>
+      <p:sp>
+        <p:nvSpPr>
+          <p:cNvPr id="6" name="TextBox 5"/>
+          <p:cNvSpPr txBox="1"/>
+          <p:nvPr/>
+        </p:nvSpPr>
+        <p:spPr>
+          <a:xfrm>
+            <a:off x="0" y="4774168"/>
+            <a:ext cx="2419277" cy="369332"/>
+          </a:xfrm>
+          <a:prstGeom prst="rect">
+            <a:avLst/>
+          </a:prstGeom>
+          <a:noFill/>
+        </p:spPr>
+        <p:txBody>
+          <a:bodyPr wrap="none" rtlCol="0">
+            <a:spAutoFit/>
           </a:bodyPr>
           <a:lstStyle/>
           <a:p>
             <a:r>
-              <a:rPr lang="en-US" dirty="0" smtClean="0"/>
-              <a:t>New audiences going straight to wireless</a:t>
-            </a:r>
-          </a:p>
-          <a:p>
-            <a:r>
-              <a:rPr lang="en-US" dirty="0" smtClean="0"/>
-              <a:t>Users pay for data outside game ecosystem</a:t>
-            </a:r>
-          </a:p>
-          <a:p>
-            <a:endParaRPr lang="en-US" sz="800" dirty="0" smtClean="0"/>
-          </a:p>
-          <a:p>
-            <a:r>
-              <a:rPr lang="en-US" dirty="0" smtClean="0"/>
-              <a:t>Cost of data is significant</a:t>
-            </a:r>
-          </a:p>
-          <a:p>
-            <a:pPr lvl="1"/>
-            <a:r>
-              <a:rPr lang="en-US" dirty="0" smtClean="0"/>
-              <a:t>Can easily cost as much as the original game</a:t>
-            </a:r>
-          </a:p>
-          <a:p>
-            <a:pPr lvl="1"/>
-            <a:endParaRPr lang="en-US" sz="800" dirty="0"/>
-          </a:p>
-          <a:p>
-            <a:r>
-              <a:rPr lang="en-US" sz="4000" dirty="0" smtClean="0"/>
-              <a:t>Total Cost of Gaming</a:t>
-            </a:r>
-          </a:p>
-          <a:p>
-            <a:pPr lvl="1"/>
-            <a:endParaRPr lang="en-US" dirty="0"/>
+              <a:rPr lang="en-US" dirty="0" smtClean="0">
+                <a:solidFill>
+                  <a:schemeClr val="bg2">
+                    <a:lumMod val="50000"/>
+                  </a:schemeClr>
+                </a:solidFill>
+              </a:rPr>
+              <a:t>Image from </a:t>
+            </a:r>
+            <a:r>
+              <a:rPr lang="en-US" dirty="0" err="1" smtClean="0">
+                <a:solidFill>
+                  <a:schemeClr val="bg2">
+                    <a:lumMod val="50000"/>
+                  </a:schemeClr>
+                </a:solidFill>
+              </a:rPr>
+              <a:t>spacex.com</a:t>
+            </a:r>
+            <a:endParaRPr lang="en-US" dirty="0">
+              <a:solidFill>
+                <a:schemeClr val="bg2">
+                  <a:lumMod val="50000"/>
+                </a:schemeClr>
+              </a:solidFill>
+            </a:endParaRPr>
           </a:p>
         </p:txBody>
       </p:sp>
     </p:spTree>
     <p:extLst>
       <p:ext uri="{BB962C8B-B14F-4D97-AF65-F5344CB8AC3E}">
-        <p14:creationId xmlns:p14="http://schemas.microsoft.com/office/powerpoint/2010/main" val="3597403837"/>
+        <p14:creationId xmlns:p14="http://schemas.microsoft.com/office/powerpoint/2010/main" val="3802749253"/>
       </p:ext>
     </p:extLst>
   </p:cSld>
   <p:clrMapOvr>
     <a:masterClrMapping/>
   </p:clrMapOvr>
+  <p:timing>
+    <p:tnLst>
+      <p:par>
+        <p:cTn xmlns:p14="http://schemas.microsoft.com/office/powerpoint/2010/main" id="1" dur="indefinite" restart="never" nodeType="tmRoot"/>
+      </p:par>
+    </p:tnLst>
+  </p:timing>
 </p:sld>
 </file>
 

</xml_diff>